<commit_message>
added text classification models
</commit_message>
<xml_diff>
--- a/Introduction_to_TextAnalysis/slides/TextAnalysis_Day1.pptx
+++ b/Introduction_to_TextAnalysis/slides/TextAnalysis_Day1.pptx
@@ -211,7 +211,7 @@
           <a:p>
             <a:fld id="{D9B77541-DA11-9644-9F01-190C20B2CA4A}" type="datetimeFigureOut">
               <a:rPr lang="en-US" smtClean="0"/>
-              <a:t>2/12/24</a:t>
+              <a:t>3/24/24</a:t>
             </a:fld>
             <a:endParaRPr lang="en-US"/>
           </a:p>
@@ -991,7 +991,7 @@
           <a:p>
             <a:fld id="{A8BC8C9D-4C8E-3846-8CD8-0E10CA42D3FC}" type="datetimeFigureOut">
               <a:rPr lang="en-US" smtClean="0"/>
-              <a:t>2/12/24</a:t>
+              <a:t>3/24/24</a:t>
             </a:fld>
             <a:endParaRPr lang="en-US"/>
           </a:p>
@@ -1189,7 +1189,7 @@
           <a:p>
             <a:fld id="{A8BC8C9D-4C8E-3846-8CD8-0E10CA42D3FC}" type="datetimeFigureOut">
               <a:rPr lang="en-US" smtClean="0"/>
-              <a:t>2/12/24</a:t>
+              <a:t>3/24/24</a:t>
             </a:fld>
             <a:endParaRPr lang="en-US"/>
           </a:p>
@@ -1397,7 +1397,7 @@
           <a:p>
             <a:fld id="{A8BC8C9D-4C8E-3846-8CD8-0E10CA42D3FC}" type="datetimeFigureOut">
               <a:rPr lang="en-US" smtClean="0"/>
-              <a:t>2/12/24</a:t>
+              <a:t>3/24/24</a:t>
             </a:fld>
             <a:endParaRPr lang="en-US"/>
           </a:p>
@@ -1595,7 +1595,7 @@
           <a:p>
             <a:fld id="{A8BC8C9D-4C8E-3846-8CD8-0E10CA42D3FC}" type="datetimeFigureOut">
               <a:rPr lang="en-US" smtClean="0"/>
-              <a:t>2/12/24</a:t>
+              <a:t>3/24/24</a:t>
             </a:fld>
             <a:endParaRPr lang="en-US"/>
           </a:p>
@@ -1870,7 +1870,7 @@
           <a:p>
             <a:fld id="{A8BC8C9D-4C8E-3846-8CD8-0E10CA42D3FC}" type="datetimeFigureOut">
               <a:rPr lang="en-US" smtClean="0"/>
-              <a:t>2/12/24</a:t>
+              <a:t>3/24/24</a:t>
             </a:fld>
             <a:endParaRPr lang="en-US"/>
           </a:p>
@@ -2135,7 +2135,7 @@
           <a:p>
             <a:fld id="{A8BC8C9D-4C8E-3846-8CD8-0E10CA42D3FC}" type="datetimeFigureOut">
               <a:rPr lang="en-US" smtClean="0"/>
-              <a:t>2/12/24</a:t>
+              <a:t>3/24/24</a:t>
             </a:fld>
             <a:endParaRPr lang="en-US"/>
           </a:p>
@@ -2547,7 +2547,7 @@
           <a:p>
             <a:fld id="{A8BC8C9D-4C8E-3846-8CD8-0E10CA42D3FC}" type="datetimeFigureOut">
               <a:rPr lang="en-US" smtClean="0"/>
-              <a:t>2/12/24</a:t>
+              <a:t>3/24/24</a:t>
             </a:fld>
             <a:endParaRPr lang="en-US"/>
           </a:p>
@@ -2688,7 +2688,7 @@
           <a:p>
             <a:fld id="{A8BC8C9D-4C8E-3846-8CD8-0E10CA42D3FC}" type="datetimeFigureOut">
               <a:rPr lang="en-US" smtClean="0"/>
-              <a:t>2/12/24</a:t>
+              <a:t>3/24/24</a:t>
             </a:fld>
             <a:endParaRPr lang="en-US"/>
           </a:p>
@@ -2801,7 +2801,7 @@
           <a:p>
             <a:fld id="{A8BC8C9D-4C8E-3846-8CD8-0E10CA42D3FC}" type="datetimeFigureOut">
               <a:rPr lang="en-US" smtClean="0"/>
-              <a:t>2/12/24</a:t>
+              <a:t>3/24/24</a:t>
             </a:fld>
             <a:endParaRPr lang="en-US"/>
           </a:p>
@@ -3112,7 +3112,7 @@
           <a:p>
             <a:fld id="{A8BC8C9D-4C8E-3846-8CD8-0E10CA42D3FC}" type="datetimeFigureOut">
               <a:rPr lang="en-US" smtClean="0"/>
-              <a:t>2/12/24</a:t>
+              <a:t>3/24/24</a:t>
             </a:fld>
             <a:endParaRPr lang="en-US"/>
           </a:p>
@@ -3400,7 +3400,7 @@
           <a:p>
             <a:fld id="{A8BC8C9D-4C8E-3846-8CD8-0E10CA42D3FC}" type="datetimeFigureOut">
               <a:rPr lang="en-US" smtClean="0"/>
-              <a:t>2/12/24</a:t>
+              <a:t>3/24/24</a:t>
             </a:fld>
             <a:endParaRPr lang="en-US"/>
           </a:p>
@@ -3641,7 +3641,7 @@
           <a:p>
             <a:fld id="{A8BC8C9D-4C8E-3846-8CD8-0E10CA42D3FC}" type="datetimeFigureOut">
               <a:rPr lang="en-US" smtClean="0"/>
-              <a:t>2/12/24</a:t>
+              <a:t>3/24/24</a:t>
             </a:fld>
             <a:endParaRPr lang="en-US"/>
           </a:p>

</xml_diff>